<commit_message>
Updates to Ch 8
</commit_message>
<xml_diff>
--- a/content/3-cc310/08-queues/01-overview-slides.pptx
+++ b/content/3-cc310/08-queues/01-overview-slides.pptx
@@ -211,7 +211,7 @@
           <a:p>
             <a:fld id="{7965C686-E975-4851-995B-B3B455D4CBEA}" type="datetimeFigureOut">
               <a:rPr lang="en-US" smtClean="0"/>
-              <a:t>3/25/2020</a:t>
+              <a:t>3/27/2020</a:t>
             </a:fld>
             <a:endParaRPr lang="en-US"/>
           </a:p>
@@ -1981,7 +1981,7 @@
           <a:p>
             <a:fld id="{6B9CC98C-563E-4F7D-9927-73EC4AAC1618}" type="datetimeFigureOut">
               <a:rPr lang="en-US" smtClean="0"/>
-              <a:t>3/25/2020</a:t>
+              <a:t>3/27/2020</a:t>
             </a:fld>
             <a:endParaRPr lang="en-US"/>
           </a:p>
@@ -2179,7 +2179,7 @@
           <a:p>
             <a:fld id="{6B9CC98C-563E-4F7D-9927-73EC4AAC1618}" type="datetimeFigureOut">
               <a:rPr lang="en-US" smtClean="0"/>
-              <a:t>3/25/2020</a:t>
+              <a:t>3/27/2020</a:t>
             </a:fld>
             <a:endParaRPr lang="en-US"/>
           </a:p>
@@ -2387,7 +2387,7 @@
           <a:p>
             <a:fld id="{6B9CC98C-563E-4F7D-9927-73EC4AAC1618}" type="datetimeFigureOut">
               <a:rPr lang="en-US" smtClean="0"/>
-              <a:t>3/25/2020</a:t>
+              <a:t>3/27/2020</a:t>
             </a:fld>
             <a:endParaRPr lang="en-US"/>
           </a:p>
@@ -2585,7 +2585,7 @@
           <a:p>
             <a:fld id="{6B9CC98C-563E-4F7D-9927-73EC4AAC1618}" type="datetimeFigureOut">
               <a:rPr lang="en-US" smtClean="0"/>
-              <a:t>3/25/2020</a:t>
+              <a:t>3/27/2020</a:t>
             </a:fld>
             <a:endParaRPr lang="en-US"/>
           </a:p>
@@ -2860,7 +2860,7 @@
           <a:p>
             <a:fld id="{6B9CC98C-563E-4F7D-9927-73EC4AAC1618}" type="datetimeFigureOut">
               <a:rPr lang="en-US" smtClean="0"/>
-              <a:t>3/25/2020</a:t>
+              <a:t>3/27/2020</a:t>
             </a:fld>
             <a:endParaRPr lang="en-US"/>
           </a:p>
@@ -3125,7 +3125,7 @@
           <a:p>
             <a:fld id="{6B9CC98C-563E-4F7D-9927-73EC4AAC1618}" type="datetimeFigureOut">
               <a:rPr lang="en-US" smtClean="0"/>
-              <a:t>3/25/2020</a:t>
+              <a:t>3/27/2020</a:t>
             </a:fld>
             <a:endParaRPr lang="en-US"/>
           </a:p>
@@ -3537,7 +3537,7 @@
           <a:p>
             <a:fld id="{6B9CC98C-563E-4F7D-9927-73EC4AAC1618}" type="datetimeFigureOut">
               <a:rPr lang="en-US" smtClean="0"/>
-              <a:t>3/25/2020</a:t>
+              <a:t>3/27/2020</a:t>
             </a:fld>
             <a:endParaRPr lang="en-US"/>
           </a:p>
@@ -3678,7 +3678,7 @@
           <a:p>
             <a:fld id="{6B9CC98C-563E-4F7D-9927-73EC4AAC1618}" type="datetimeFigureOut">
               <a:rPr lang="en-US" smtClean="0"/>
-              <a:t>3/25/2020</a:t>
+              <a:t>3/27/2020</a:t>
             </a:fld>
             <a:endParaRPr lang="en-US"/>
           </a:p>
@@ -3791,7 +3791,7 @@
           <a:p>
             <a:fld id="{6B9CC98C-563E-4F7D-9927-73EC4AAC1618}" type="datetimeFigureOut">
               <a:rPr lang="en-US" smtClean="0"/>
-              <a:t>3/25/2020</a:t>
+              <a:t>3/27/2020</a:t>
             </a:fld>
             <a:endParaRPr lang="en-US"/>
           </a:p>
@@ -4102,7 +4102,7 @@
           <a:p>
             <a:fld id="{6B9CC98C-563E-4F7D-9927-73EC4AAC1618}" type="datetimeFigureOut">
               <a:rPr lang="en-US" smtClean="0"/>
-              <a:t>3/25/2020</a:t>
+              <a:t>3/27/2020</a:t>
             </a:fld>
             <a:endParaRPr lang="en-US"/>
           </a:p>
@@ -4394,7 +4394,7 @@
           <a:p>
             <a:fld id="{6B9CC98C-563E-4F7D-9927-73EC4AAC1618}" type="datetimeFigureOut">
               <a:rPr lang="en-US" smtClean="0"/>
-              <a:t>3/25/2020</a:t>
+              <a:t>3/27/2020</a:t>
             </a:fld>
             <a:endParaRPr lang="en-US"/>
           </a:p>
@@ -4473,9 +4473,7 @@
     <p:bg>
       <p:bgPr>
         <a:solidFill>
-          <a:schemeClr val="bg1">
-            <a:lumMod val="85000"/>
-          </a:schemeClr>
+          <a:srgbClr val="C0C0C0"/>
         </a:solidFill>
         <a:effectLst/>
       </p:bgPr>
@@ -4642,7 +4640,7 @@
           <a:p>
             <a:fld id="{6B9CC98C-563E-4F7D-9927-73EC4AAC1618}" type="datetimeFigureOut">
               <a:rPr lang="en-US" smtClean="0"/>
-              <a:t>3/25/2020</a:t>
+              <a:t>3/27/2020</a:t>
             </a:fld>
             <a:endParaRPr lang="en-US"/>
           </a:p>
@@ -5043,7 +5041,7 @@
 </file>
 
 <file path=ppt/slides/slide1.xml><?xml version="1.0" encoding="utf-8"?>
-<p:sld xmlns:a="http://schemas.openxmlformats.org/drawingml/2006/main" xmlns:r="http://schemas.openxmlformats.org/officeDocument/2006/relationships" xmlns:p="http://schemas.openxmlformats.org/presentationml/2006/main">
+<p:sld xmlns:a="http://schemas.openxmlformats.org/drawingml/2006/main" xmlns:r="http://schemas.openxmlformats.org/officeDocument/2006/relationships" xmlns:p="http://schemas.openxmlformats.org/presentationml/2006/main" show="0">
   <p:cSld>
     <p:spTree>
       <p:nvGrpSpPr>
@@ -5225,16 +5223,6 @@
 <file path=ppt/slides/slide10.xml><?xml version="1.0" encoding="utf-8"?>
 <p:sld xmlns:a="http://schemas.openxmlformats.org/drawingml/2006/main" xmlns:r="http://schemas.openxmlformats.org/officeDocument/2006/relationships" xmlns:p="http://schemas.openxmlformats.org/presentationml/2006/main">
   <p:cSld>
-    <p:bg>
-      <p:bgPr>
-        <a:solidFill>
-          <a:schemeClr val="bg1">
-            <a:lumMod val="85000"/>
-          </a:schemeClr>
-        </a:solidFill>
-        <a:effectLst/>
-      </p:bgPr>
-    </p:bg>
     <p:spTree>
       <p:nvGrpSpPr>
         <p:cNvPr id="1" name=""/>
@@ -5806,16 +5794,6 @@
 <file path=ppt/slides/slide11.xml><?xml version="1.0" encoding="utf-8"?>
 <p:sld xmlns:a="http://schemas.openxmlformats.org/drawingml/2006/main" xmlns:r="http://schemas.openxmlformats.org/officeDocument/2006/relationships" xmlns:p="http://schemas.openxmlformats.org/presentationml/2006/main">
   <p:cSld>
-    <p:bg>
-      <p:bgPr>
-        <a:solidFill>
-          <a:schemeClr val="bg1">
-            <a:lumMod val="85000"/>
-          </a:schemeClr>
-        </a:solidFill>
-        <a:effectLst/>
-      </p:bgPr>
-    </p:bg>
     <p:spTree>
       <p:nvGrpSpPr>
         <p:cNvPr id="1" name=""/>
@@ -6348,16 +6326,6 @@
 <file path=ppt/slides/slide12.xml><?xml version="1.0" encoding="utf-8"?>
 <p:sld xmlns:a="http://schemas.openxmlformats.org/drawingml/2006/main" xmlns:r="http://schemas.openxmlformats.org/officeDocument/2006/relationships" xmlns:p="http://schemas.openxmlformats.org/presentationml/2006/main">
   <p:cSld>
-    <p:bg>
-      <p:bgPr>
-        <a:solidFill>
-          <a:schemeClr val="bg1">
-            <a:lumMod val="85000"/>
-          </a:schemeClr>
-        </a:solidFill>
-        <a:effectLst/>
-      </p:bgPr>
-    </p:bg>
     <p:spTree>
       <p:nvGrpSpPr>
         <p:cNvPr id="1" name=""/>
@@ -7414,16 +7382,6 @@
 <file path=ppt/slides/slide14.xml><?xml version="1.0" encoding="utf-8"?>
 <p:sld xmlns:a="http://schemas.openxmlformats.org/drawingml/2006/main" xmlns:r="http://schemas.openxmlformats.org/officeDocument/2006/relationships" xmlns:p="http://schemas.openxmlformats.org/presentationml/2006/main">
   <p:cSld>
-    <p:bg>
-      <p:bgPr>
-        <a:solidFill>
-          <a:schemeClr val="bg1">
-            <a:lumMod val="85000"/>
-          </a:schemeClr>
-        </a:solidFill>
-        <a:effectLst/>
-      </p:bgPr>
-    </p:bg>
     <p:spTree>
       <p:nvGrpSpPr>
         <p:cNvPr id="1" name=""/>
@@ -8493,16 +8451,6 @@
 <file path=ppt/slides/slide3.xml><?xml version="1.0" encoding="utf-8"?>
 <p:sld xmlns:a="http://schemas.openxmlformats.org/drawingml/2006/main" xmlns:r="http://schemas.openxmlformats.org/officeDocument/2006/relationships" xmlns:p="http://schemas.openxmlformats.org/presentationml/2006/main">
   <p:cSld>
-    <p:bg>
-      <p:bgPr>
-        <a:solidFill>
-          <a:schemeClr val="bg1">
-            <a:lumMod val="85000"/>
-          </a:schemeClr>
-        </a:solidFill>
-        <a:effectLst/>
-      </p:bgPr>
-    </p:bg>
     <p:spTree>
       <p:nvGrpSpPr>
         <p:cNvPr id="1" name=""/>
@@ -9031,16 +8979,6 @@
 <file path=ppt/slides/slide4.xml><?xml version="1.0" encoding="utf-8"?>
 <p:sld xmlns:a="http://schemas.openxmlformats.org/drawingml/2006/main" xmlns:r="http://schemas.openxmlformats.org/officeDocument/2006/relationships" xmlns:p="http://schemas.openxmlformats.org/presentationml/2006/main">
   <p:cSld>
-    <p:bg>
-      <p:bgPr>
-        <a:solidFill>
-          <a:schemeClr val="bg1">
-            <a:lumMod val="85000"/>
-          </a:schemeClr>
-        </a:solidFill>
-        <a:effectLst/>
-      </p:bgPr>
-    </p:bg>
     <p:spTree>
       <p:nvGrpSpPr>
         <p:cNvPr id="1" name=""/>
@@ -9573,16 +9511,6 @@
 <file path=ppt/slides/slide5.xml><?xml version="1.0" encoding="utf-8"?>
 <p:sld xmlns:a="http://schemas.openxmlformats.org/drawingml/2006/main" xmlns:r="http://schemas.openxmlformats.org/officeDocument/2006/relationships" xmlns:p="http://schemas.openxmlformats.org/presentationml/2006/main">
   <p:cSld>
-    <p:bg>
-      <p:bgPr>
-        <a:solidFill>
-          <a:schemeClr val="bg1">
-            <a:lumMod val="85000"/>
-          </a:schemeClr>
-        </a:solidFill>
-        <a:effectLst/>
-      </p:bgPr>
-    </p:bg>
     <p:spTree>
       <p:nvGrpSpPr>
         <p:cNvPr id="1" name=""/>
@@ -10118,16 +10046,6 @@
 <file path=ppt/slides/slide6.xml><?xml version="1.0" encoding="utf-8"?>
 <p:sld xmlns:a="http://schemas.openxmlformats.org/drawingml/2006/main" xmlns:r="http://schemas.openxmlformats.org/officeDocument/2006/relationships" xmlns:p="http://schemas.openxmlformats.org/presentationml/2006/main">
   <p:cSld>
-    <p:bg>
-      <p:bgPr>
-        <a:solidFill>
-          <a:schemeClr val="bg1">
-            <a:lumMod val="85000"/>
-          </a:schemeClr>
-        </a:solidFill>
-        <a:effectLst/>
-      </p:bgPr>
-    </p:bg>
     <p:spTree>
       <p:nvGrpSpPr>
         <p:cNvPr id="1" name=""/>
@@ -10741,16 +10659,6 @@
 <file path=ppt/slides/slide7.xml><?xml version="1.0" encoding="utf-8"?>
 <p:sld xmlns:a="http://schemas.openxmlformats.org/drawingml/2006/main" xmlns:r="http://schemas.openxmlformats.org/officeDocument/2006/relationships" xmlns:p="http://schemas.openxmlformats.org/presentationml/2006/main">
   <p:cSld>
-    <p:bg>
-      <p:bgPr>
-        <a:solidFill>
-          <a:schemeClr val="bg1">
-            <a:lumMod val="85000"/>
-          </a:schemeClr>
-        </a:solidFill>
-        <a:effectLst/>
-      </p:bgPr>
-    </p:bg>
     <p:spTree>
       <p:nvGrpSpPr>
         <p:cNvPr id="1" name=""/>
@@ -11325,16 +11233,6 @@
 <file path=ppt/slides/slide8.xml><?xml version="1.0" encoding="utf-8"?>
 <p:sld xmlns:a="http://schemas.openxmlformats.org/drawingml/2006/main" xmlns:r="http://schemas.openxmlformats.org/officeDocument/2006/relationships" xmlns:p="http://schemas.openxmlformats.org/presentationml/2006/main">
   <p:cSld>
-    <p:bg>
-      <p:bgPr>
-        <a:solidFill>
-          <a:schemeClr val="bg1">
-            <a:lumMod val="85000"/>
-          </a:schemeClr>
-        </a:solidFill>
-        <a:effectLst/>
-      </p:bgPr>
-    </p:bg>
     <p:spTree>
       <p:nvGrpSpPr>
         <p:cNvPr id="1" name=""/>
@@ -11906,16 +11804,6 @@
 <file path=ppt/slides/slide9.xml><?xml version="1.0" encoding="utf-8"?>
 <p:sld xmlns:a="http://schemas.openxmlformats.org/drawingml/2006/main" xmlns:r="http://schemas.openxmlformats.org/officeDocument/2006/relationships" xmlns:p="http://schemas.openxmlformats.org/presentationml/2006/main">
   <p:cSld>
-    <p:bg>
-      <p:bgPr>
-        <a:solidFill>
-          <a:schemeClr val="bg1">
-            <a:lumMod val="85000"/>
-          </a:schemeClr>
-        </a:solidFill>
-        <a:effectLst/>
-      </p:bgPr>
-    </p:bg>
     <p:spTree>
       <p:nvGrpSpPr>
         <p:cNvPr id="1" name=""/>

</xml_diff>